<commit_message>
added some info to slides, may need more info on data mining uses
</commit_message>
<xml_diff>
--- a/textcat package presentation.pptx
+++ b/textcat package presentation.pptx
@@ -119,6 +119,11 @@
       </a:defRPr>
     </a:lvl9pPr>
   </p:defaultTextStyle>
+  <p:extLst>
+    <p:ext uri="{EFAFB233-063F-42B5-8137-9DF3F51BA10A}">
+      <p15:sldGuideLst xmlns:p15="http://schemas.microsoft.com/office/powerpoint/2012/main"/>
+    </p:ext>
+  </p:extLst>
 </p:presentation>
 </file>
 
@@ -457,7 +462,7 @@
           <a:p>
             <a:fld id="{0B395AAB-A487-4E63-8CF8-EFECD1FF15D7}" type="datetimeFigureOut">
               <a:rPr lang="en-US" smtClean="0"/>
-              <a:t>11/24/2021</a:t>
+              <a:t>11/26/21</a:t>
             </a:fld>
             <a:endParaRPr lang="en-US"/>
           </a:p>
@@ -1545,7 +1550,7 @@
           <a:p>
             <a:fld id="{0B395AAB-A487-4E63-8CF8-EFECD1FF15D7}" type="datetimeFigureOut">
               <a:rPr lang="en-US" smtClean="0"/>
-              <a:t>11/24/2021</a:t>
+              <a:t>11/26/21</a:t>
             </a:fld>
             <a:endParaRPr lang="en-US"/>
           </a:p>
@@ -2525,7 +2530,7 @@
           <a:p>
             <a:fld id="{0B395AAB-A487-4E63-8CF8-EFECD1FF15D7}" type="datetimeFigureOut">
               <a:rPr lang="en-US" smtClean="0"/>
-              <a:t>11/24/2021</a:t>
+              <a:t>11/26/21</a:t>
             </a:fld>
             <a:endParaRPr lang="en-US"/>
           </a:p>
@@ -3659,7 +3664,7 @@
           <a:p>
             <a:fld id="{0B395AAB-A487-4E63-8CF8-EFECD1FF15D7}" type="datetimeFigureOut">
               <a:rPr lang="en-US" smtClean="0"/>
-              <a:t>11/24/2021</a:t>
+              <a:t>11/26/21</a:t>
             </a:fld>
             <a:endParaRPr lang="en-US"/>
           </a:p>
@@ -4692,7 +4697,7 @@
           <a:p>
             <a:fld id="{0B395AAB-A487-4E63-8CF8-EFECD1FF15D7}" type="datetimeFigureOut">
               <a:rPr lang="en-US" smtClean="0"/>
-              <a:t>11/24/2021</a:t>
+              <a:t>11/26/21</a:t>
             </a:fld>
             <a:endParaRPr lang="en-US"/>
           </a:p>
@@ -5352,7 +5357,7 @@
           <a:p>
             <a:fld id="{0B395AAB-A487-4E63-8CF8-EFECD1FF15D7}" type="datetimeFigureOut">
               <a:rPr lang="en-US" smtClean="0"/>
-              <a:t>11/24/2021</a:t>
+              <a:t>11/26/21</a:t>
             </a:fld>
             <a:endParaRPr lang="en-US"/>
           </a:p>
@@ -6213,7 +6218,7 @@
           <a:p>
             <a:fld id="{0B395AAB-A487-4E63-8CF8-EFECD1FF15D7}" type="datetimeFigureOut">
               <a:rPr lang="en-US" smtClean="0"/>
-              <a:t>11/24/2021</a:t>
+              <a:t>11/26/21</a:t>
             </a:fld>
             <a:endParaRPr lang="en-US"/>
           </a:p>
@@ -6403,7 +6408,7 @@
           <a:p>
             <a:fld id="{0B395AAB-A487-4E63-8CF8-EFECD1FF15D7}" type="datetimeFigureOut">
               <a:rPr lang="en-US" smtClean="0"/>
-              <a:t>11/24/2021</a:t>
+              <a:t>11/26/21</a:t>
             </a:fld>
             <a:endParaRPr lang="en-US"/>
           </a:p>
@@ -7375,7 +7380,7 @@
           <a:p>
             <a:fld id="{0B395AAB-A487-4E63-8CF8-EFECD1FF15D7}" type="datetimeFigureOut">
               <a:rPr lang="en-US" smtClean="0"/>
-              <a:t>11/24/2021</a:t>
+              <a:t>11/26/21</a:t>
             </a:fld>
             <a:endParaRPr lang="en-US"/>
           </a:p>
@@ -7586,7 +7591,7 @@
           <a:p>
             <a:fld id="{0B395AAB-A487-4E63-8CF8-EFECD1FF15D7}" type="datetimeFigureOut">
               <a:rPr lang="en-US" smtClean="0"/>
-              <a:t>11/24/2021</a:t>
+              <a:t>11/26/21</a:t>
             </a:fld>
             <a:endParaRPr lang="en-US"/>
           </a:p>
@@ -8620,7 +8625,7 @@
           <a:p>
             <a:fld id="{0B395AAB-A487-4E63-8CF8-EFECD1FF15D7}" type="datetimeFigureOut">
               <a:rPr lang="en-US" smtClean="0"/>
-              <a:t>11/24/2021</a:t>
+              <a:t>11/26/21</a:t>
             </a:fld>
             <a:endParaRPr lang="en-US"/>
           </a:p>
@@ -8892,7 +8897,7 @@
           <a:p>
             <a:fld id="{0B395AAB-A487-4E63-8CF8-EFECD1FF15D7}" type="datetimeFigureOut">
               <a:rPr lang="en-US" smtClean="0"/>
-              <a:t>11/24/2021</a:t>
+              <a:t>11/26/21</a:t>
             </a:fld>
             <a:endParaRPr lang="en-US"/>
           </a:p>
@@ -9302,7 +9307,7 @@
           <a:p>
             <a:fld id="{0B395AAB-A487-4E63-8CF8-EFECD1FF15D7}" type="datetimeFigureOut">
               <a:rPr lang="en-US" smtClean="0"/>
-              <a:t>11/24/2021</a:t>
+              <a:t>11/26/21</a:t>
             </a:fld>
             <a:endParaRPr lang="en-US"/>
           </a:p>
@@ -9429,7 +9434,7 @@
           <a:p>
             <a:fld id="{0B395AAB-A487-4E63-8CF8-EFECD1FF15D7}" type="datetimeFigureOut">
               <a:rPr lang="en-US" smtClean="0"/>
-              <a:t>11/24/2021</a:t>
+              <a:t>11/26/21</a:t>
             </a:fld>
             <a:endParaRPr lang="en-US"/>
           </a:p>
@@ -9524,7 +9529,7 @@
           <a:p>
             <a:fld id="{0B395AAB-A487-4E63-8CF8-EFECD1FF15D7}" type="datetimeFigureOut">
               <a:rPr lang="en-US" smtClean="0"/>
-              <a:t>11/24/2021</a:t>
+              <a:t>11/26/21</a:t>
             </a:fld>
             <a:endParaRPr lang="en-US"/>
           </a:p>
@@ -10605,7 +10610,7 @@
           <a:p>
             <a:fld id="{0B395AAB-A487-4E63-8CF8-EFECD1FF15D7}" type="datetimeFigureOut">
               <a:rPr lang="en-US" smtClean="0"/>
-              <a:t>11/24/2021</a:t>
+              <a:t>11/26/21</a:t>
             </a:fld>
             <a:endParaRPr lang="en-US"/>
           </a:p>
@@ -11713,7 +11718,7 @@
           <a:p>
             <a:fld id="{0B395AAB-A487-4E63-8CF8-EFECD1FF15D7}" type="datetimeFigureOut">
               <a:rPr lang="en-US" smtClean="0"/>
-              <a:t>11/24/2021</a:t>
+              <a:t>11/26/21</a:t>
             </a:fld>
             <a:endParaRPr lang="en-US"/>
           </a:p>
@@ -12710,7 +12715,7 @@
           <a:p>
             <a:fld id="{0B395AAB-A487-4E63-8CF8-EFECD1FF15D7}" type="datetimeFigureOut">
               <a:rPr lang="en-US" smtClean="0"/>
-              <a:t>11/24/2021</a:t>
+              <a:t>11/26/21</a:t>
             </a:fld>
             <a:endParaRPr lang="en-US"/>
           </a:p>
@@ -15589,7 +15594,7 @@
           <a:p>
             <a:r>
               <a:rPr lang="en-US" dirty="0"/>
-              <a:t>(how this relates to INFO 523 topics)</a:t>
+              <a:t>How this relates to Data Mining</a:t>
             </a:r>
           </a:p>
         </p:txBody>
@@ -15615,7 +15620,22 @@
           <a:bodyPr/>
           <a:lstStyle/>
           <a:p>
-            <a:endParaRPr lang="en-US" dirty="0"/>
+            <a:r>
+              <a:rPr lang="en-US" dirty="0"/>
+              <a:t>Allows for quick language detection of a large body of text by analyzing strings of text and comparing them to the texts stored in its database</a:t>
+            </a:r>
+          </a:p>
+          <a:p>
+            <a:r>
+              <a:rPr lang="en-US" dirty="0"/>
+              <a:t>Useful for optimized translation applications that take a string of text and give a direct translation back to the user</a:t>
+            </a:r>
+          </a:p>
+          <a:p>
+            <a:r>
+              <a:rPr lang="en-US" dirty="0"/>
+              <a:t>Can also be used to identify languages within texts that may be unknown to the reader</a:t>
+            </a:r>
           </a:p>
         </p:txBody>
       </p:sp>
@@ -15672,7 +15692,7 @@
           <a:p>
             <a:r>
               <a:rPr lang="en-US" dirty="0"/>
-              <a:t>(real world applications w/ example)</a:t>
+              <a:t>Using Textcat in a translation app	</a:t>
             </a:r>
           </a:p>
         </p:txBody>
@@ -15698,7 +15718,21 @@
           <a:bodyPr/>
           <a:lstStyle/>
           <a:p>
-            <a:endParaRPr lang="en-US"/>
+            <a:r>
+              <a:rPr lang="en-US" dirty="0"/>
+              <a:t>Quick translation apps (think Google Translate) allow users to type in a string of words and the app will then detect the users language.</a:t>
+            </a:r>
+          </a:p>
+          <a:p>
+            <a:r>
+              <a:rPr lang="en-US" dirty="0"/>
+              <a:t>Textcat provides this same implementation and can be used for quick </a:t>
+            </a:r>
+            <a:r>
+              <a:rPr lang="en-US"/>
+              <a:t>language detection </a:t>
+            </a:r>
+            <a:endParaRPr lang="en-US" dirty="0"/>
           </a:p>
         </p:txBody>
       </p:sp>

</xml_diff>